<commit_message>
edits on resubmit finished
</commit_message>
<xml_diff>
--- a/figures/anomaly_schematic.pptx
+++ b/figures/anomaly_schematic.pptx
@@ -1306,6 +1306,46 @@
       </pc:sldChg>
     </pc:docChg>
   </pc:docChgLst>
+  <pc:docChgLst>
+    <pc:chgData name="Hollister, Jeff" userId="90904e2a-aa82-465e-9922-afce4bc6d524" providerId="ADAL" clId="{EE19FD1B-8BEF-44DF-87D8-1C4DB7C4C1BC}"/>
+    <pc:docChg chg="modSld">
+      <pc:chgData name="Hollister, Jeff" userId="90904e2a-aa82-465e-9922-afce4bc6d524" providerId="ADAL" clId="{EE19FD1B-8BEF-44DF-87D8-1C4DB7C4C1BC}" dt="2020-12-04T17:52:21.714" v="28" actId="20577"/>
+      <pc:docMkLst>
+        <pc:docMk/>
+      </pc:docMkLst>
+      <pc:sldChg chg="modSp">
+        <pc:chgData name="Hollister, Jeff" userId="90904e2a-aa82-465e-9922-afce4bc6d524" providerId="ADAL" clId="{EE19FD1B-8BEF-44DF-87D8-1C4DB7C4C1BC}" dt="2020-12-04T17:52:21.714" v="28" actId="20577"/>
+        <pc:sldMkLst>
+          <pc:docMk/>
+          <pc:sldMk cId="1258879937" sldId="257"/>
+        </pc:sldMkLst>
+        <pc:spChg chg="mod">
+          <ac:chgData name="Hollister, Jeff" userId="90904e2a-aa82-465e-9922-afce4bc6d524" providerId="ADAL" clId="{EE19FD1B-8BEF-44DF-87D8-1C4DB7C4C1BC}" dt="2020-12-04T17:52:08.561" v="8" actId="20577"/>
+          <ac:spMkLst>
+            <pc:docMk/>
+            <pc:sldMk cId="1258879937" sldId="257"/>
+            <ac:spMk id="4" creationId="{9DAAA7D2-1A2B-4088-BAD1-9556A15760E2}"/>
+          </ac:spMkLst>
+        </pc:spChg>
+        <pc:spChg chg="mod">
+          <ac:chgData name="Hollister, Jeff" userId="90904e2a-aa82-465e-9922-afce4bc6d524" providerId="ADAL" clId="{EE19FD1B-8BEF-44DF-87D8-1C4DB7C4C1BC}" dt="2020-12-04T17:52:16.170" v="19" actId="20577"/>
+          <ac:spMkLst>
+            <pc:docMk/>
+            <pc:sldMk cId="1258879937" sldId="257"/>
+            <ac:spMk id="5" creationId="{8C9786EB-34F3-4C77-BDCA-E8BD08FE1D11}"/>
+          </ac:spMkLst>
+        </pc:spChg>
+        <pc:spChg chg="mod">
+          <ac:chgData name="Hollister, Jeff" userId="90904e2a-aa82-465e-9922-afce4bc6d524" providerId="ADAL" clId="{EE19FD1B-8BEF-44DF-87D8-1C4DB7C4C1BC}" dt="2020-12-04T17:52:21.714" v="28" actId="20577"/>
+          <ac:spMkLst>
+            <pc:docMk/>
+            <pc:sldMk cId="1258879937" sldId="257"/>
+            <ac:spMk id="6" creationId="{6A1187EE-F5D0-4199-837E-29800767DC0A}"/>
+          </ac:spMkLst>
+        </pc:spChg>
+      </pc:sldChg>
+    </pc:docChg>
+  </pc:docChgLst>
 </pc:chgInfo>
 </file>
 
@@ -1440,7 +1480,7 @@
           <a:p>
             <a:fld id="{F7167FF9-F47C-4F59-88DD-9CEB65E35CFA}" type="datetimeFigureOut">
               <a:rPr lang="en-US" smtClean="0"/>
-              <a:t>9/10/2020</a:t>
+              <a:t>12/4/2020</a:t>
             </a:fld>
             <a:endParaRPr lang="en-US"/>
           </a:p>
@@ -1610,7 +1650,7 @@
           <a:p>
             <a:fld id="{F7167FF9-F47C-4F59-88DD-9CEB65E35CFA}" type="datetimeFigureOut">
               <a:rPr lang="en-US" smtClean="0"/>
-              <a:t>9/10/2020</a:t>
+              <a:t>12/4/2020</a:t>
             </a:fld>
             <a:endParaRPr lang="en-US"/>
           </a:p>
@@ -1790,7 +1830,7 @@
           <a:p>
             <a:fld id="{F7167FF9-F47C-4F59-88DD-9CEB65E35CFA}" type="datetimeFigureOut">
               <a:rPr lang="en-US" smtClean="0"/>
-              <a:t>9/10/2020</a:t>
+              <a:t>12/4/2020</a:t>
             </a:fld>
             <a:endParaRPr lang="en-US"/>
           </a:p>
@@ -1960,7 +2000,7 @@
           <a:p>
             <a:fld id="{F7167FF9-F47C-4F59-88DD-9CEB65E35CFA}" type="datetimeFigureOut">
               <a:rPr lang="en-US" smtClean="0"/>
-              <a:t>9/10/2020</a:t>
+              <a:t>12/4/2020</a:t>
             </a:fld>
             <a:endParaRPr lang="en-US"/>
           </a:p>
@@ -2204,7 +2244,7 @@
           <a:p>
             <a:fld id="{F7167FF9-F47C-4F59-88DD-9CEB65E35CFA}" type="datetimeFigureOut">
               <a:rPr lang="en-US" smtClean="0"/>
-              <a:t>9/10/2020</a:t>
+              <a:t>12/4/2020</a:t>
             </a:fld>
             <a:endParaRPr lang="en-US"/>
           </a:p>
@@ -2436,7 +2476,7 @@
           <a:p>
             <a:fld id="{F7167FF9-F47C-4F59-88DD-9CEB65E35CFA}" type="datetimeFigureOut">
               <a:rPr lang="en-US" smtClean="0"/>
-              <a:t>9/10/2020</a:t>
+              <a:t>12/4/2020</a:t>
             </a:fld>
             <a:endParaRPr lang="en-US"/>
           </a:p>
@@ -2803,7 +2843,7 @@
           <a:p>
             <a:fld id="{F7167FF9-F47C-4F59-88DD-9CEB65E35CFA}" type="datetimeFigureOut">
               <a:rPr lang="en-US" smtClean="0"/>
-              <a:t>9/10/2020</a:t>
+              <a:t>12/4/2020</a:t>
             </a:fld>
             <a:endParaRPr lang="en-US"/>
           </a:p>
@@ -2921,7 +2961,7 @@
           <a:p>
             <a:fld id="{F7167FF9-F47C-4F59-88DD-9CEB65E35CFA}" type="datetimeFigureOut">
               <a:rPr lang="en-US" smtClean="0"/>
-              <a:t>9/10/2020</a:t>
+              <a:t>12/4/2020</a:t>
             </a:fld>
             <a:endParaRPr lang="en-US"/>
           </a:p>
@@ -3016,7 +3056,7 @@
           <a:p>
             <a:fld id="{F7167FF9-F47C-4F59-88DD-9CEB65E35CFA}" type="datetimeFigureOut">
               <a:rPr lang="en-US" smtClean="0"/>
-              <a:t>9/10/2020</a:t>
+              <a:t>12/4/2020</a:t>
             </a:fld>
             <a:endParaRPr lang="en-US"/>
           </a:p>
@@ -3293,7 +3333,7 @@
           <a:p>
             <a:fld id="{F7167FF9-F47C-4F59-88DD-9CEB65E35CFA}" type="datetimeFigureOut">
               <a:rPr lang="en-US" smtClean="0"/>
-              <a:t>9/10/2020</a:t>
+              <a:t>12/4/2020</a:t>
             </a:fld>
             <a:endParaRPr lang="en-US"/>
           </a:p>
@@ -3550,7 +3590,7 @@
           <a:p>
             <a:fld id="{F7167FF9-F47C-4F59-88DD-9CEB65E35CFA}" type="datetimeFigureOut">
               <a:rPr lang="en-US" smtClean="0"/>
-              <a:t>9/10/2020</a:t>
+              <a:t>12/4/2020</a:t>
             </a:fld>
             <a:endParaRPr lang="en-US"/>
           </a:p>
@@ -3763,7 +3803,7 @@
           <a:p>
             <a:fld id="{F7167FF9-F47C-4F59-88DD-9CEB65E35CFA}" type="datetimeFigureOut">
               <a:rPr lang="en-US" smtClean="0"/>
-              <a:t>9/10/2020</a:t>
+              <a:t>12/4/2020</a:t>
             </a:fld>
             <a:endParaRPr lang="en-US"/>
           </a:p>
@@ -4183,7 +4223,7 @@
         <p:spPr>
           <a:xfrm>
             <a:off x="14306" y="419141"/>
-            <a:ext cx="830677" cy="646331"/>
+            <a:ext cx="795411" cy="646331"/>
           </a:xfrm>
           <a:prstGeom prst="rect">
             <a:avLst/>
@@ -4206,7 +4246,7 @@
                 <a:latin typeface="Roboto Condensed" panose="02000000000000000000" pitchFamily="2" charset="0"/>
                 <a:ea typeface="Roboto Condensed" panose="02000000000000000000" pitchFamily="2" charset="0"/>
               </a:rPr>
-              <a:t>Station 1</a:t>
+              <a:t>Site 1</a:t>
             </a:r>
           </a:p>
           <a:p>
@@ -4271,7 +4311,7 @@
                 <a:latin typeface="Roboto Condensed" panose="02000000000000000000" pitchFamily="2" charset="0"/>
                 <a:ea typeface="Roboto Condensed" panose="02000000000000000000" pitchFamily="2" charset="0"/>
               </a:rPr>
-              <a:t>Station 2</a:t>
+              <a:t>Site 2</a:t>
             </a:r>
           </a:p>
           <a:p>
@@ -4327,6 +4367,18 @@
           <a:lstStyle/>
           <a:p>
             <a:r>
+              <a:rPr lang="en-US" sz="1400" b="1">
+                <a:solidFill>
+                  <a:schemeClr val="bg2">
+                    <a:lumMod val="25000"/>
+                  </a:schemeClr>
+                </a:solidFill>
+                <a:latin typeface="Roboto Condensed" panose="02000000000000000000" pitchFamily="2" charset="0"/>
+                <a:ea typeface="Roboto Condensed" panose="02000000000000000000" pitchFamily="2" charset="0"/>
+              </a:rPr>
+              <a:t>Site </a:t>
+            </a:r>
+            <a:r>
               <a:rPr lang="en-US" sz="1400" b="1" dirty="0">
                 <a:solidFill>
                   <a:schemeClr val="bg2">
@@ -4336,7 +4388,7 @@
                 <a:latin typeface="Roboto Condensed" panose="02000000000000000000" pitchFamily="2" charset="0"/>
                 <a:ea typeface="Roboto Condensed" panose="02000000000000000000" pitchFamily="2" charset="0"/>
               </a:rPr>
-              <a:t>Station 3</a:t>
+              <a:t>3</a:t>
             </a:r>
           </a:p>
           <a:p>

</xml_diff>